<commit_message>
with the good species aesthetic file
</commit_message>
<xml_diff>
--- a/figures_tables/fig_1.pptx
+++ b/figures_tables/fig_1.pptx
@@ -107,12 +107,12 @@
   <p:extLst>
     <p:ext uri="{EFAFB233-063F-42B5-8137-9DF3F51BA10A}">
       <p15:sldGuideLst xmlns:p15="http://schemas.microsoft.com/office/powerpoint/2012/main">
-        <p15:guide id="1" orient="horz" pos="4088" userDrawn="1">
+        <p15:guide id="1" orient="horz" pos="391" userDrawn="1">
           <p15:clr>
             <a:srgbClr val="A4A3A4"/>
           </p15:clr>
         </p15:guide>
-        <p15:guide id="2" pos="5624" userDrawn="1">
+        <p15:guide id="2" pos="703" userDrawn="1">
           <p15:clr>
             <a:srgbClr val="A4A3A4"/>
           </p15:clr>
@@ -2793,10 +2793,10 @@
       </p:grpSpPr>
       <p:pic>
         <p:nvPicPr>
-          <p:cNvPr id="7" name="Image 6">
+          <p:cNvPr id="3" name="Image 2">
             <a:extLst>
               <a:ext uri="{FF2B5EF4-FFF2-40B4-BE49-F238E27FC236}">
-                <a16:creationId xmlns:a16="http://schemas.microsoft.com/office/drawing/2014/main" id="{B6663435-2B9F-2A48-B8EC-D6EAC8DAC548}"/>
+                <a16:creationId xmlns:a16="http://schemas.microsoft.com/office/drawing/2014/main" id="{A18B7041-6632-E543-9643-7B40A667183D}"/>
               </a:ext>
             </a:extLst>
           </p:cNvPr>
@@ -2813,8 +2813,8 @@
         </p:blipFill>
         <p:spPr>
           <a:xfrm>
-            <a:off x="620110" y="554898"/>
-            <a:ext cx="7903779" cy="5748203"/>
+            <a:off x="628004" y="559284"/>
+            <a:ext cx="7910100" cy="5752800"/>
           </a:xfrm>
           <a:prstGeom prst="rect">
             <a:avLst/>

</xml_diff>